<commit_message>
update pptx and rmd
</commit_message>
<xml_diff>
--- a/powerpoint.pptx
+++ b/powerpoint.pptx
@@ -45,6 +45,7 @@
     <p:sldId id="293" r:id="rId39"/>
     <p:sldId id="294" r:id="rId40"/>
     <p:sldId id="295" r:id="rId41"/>
+    <p:sldId id="296" r:id="rId42"/>
   </p:sldIdLst>
   <p:sldSz cx="9144000" cy="5143500" type="screen16x9"/>
   <p:notesSz cx="6858000" cy="9144000"/>
@@ -3700,6 +3701,20 @@
               <a:t>j</a:t>
             </a:r>
           </a:p>
+          <a:p>
+            <a:pPr lvl="0"/>
+            <a:r>
+              <a:rPr/>
+              <a:t>Each of the 150 simulations were fitted with the Gauss error function</a:t>
+            </a:r>
+          </a:p>
+          <a:p>
+            <a:pPr lvl="0"/>
+            <a:r>
+              <a:rPr/>
+              <a:t>Then determined the date of the flex for each simulation</a:t>
+            </a:r>
+          </a:p>
         </p:txBody>
       </p:sp>
     </p:spTree>
@@ -3826,7 +3841,7 @@
             </a:pPr>
             <a:r>
               <a:rPr/>
-              <a:t>150 Monte Carlo simulations plotted</a:t>
+              <a:t>MonteCarlo Simulation Data (Cases) (150 trials)</a:t>
             </a:r>
           </a:p>
         </p:txBody>
@@ -4005,7 +4020,7 @@
             </a:pPr>
             <a:r>
               <a:rPr/>
-              <a:t>Applying the day of flex indicator to the plot (Fatalities)</a:t>
+              <a:t>MonteCarlo Simulation Data (Fatalities) (150 trials)</a:t>
             </a:r>
           </a:p>
         </p:txBody>
@@ -4158,12 +4173,7 @@
             <p:ph type="title"/>
           </p:nvPr>
         </p:nvSpPr>
-        <p:spPr>
-          <a:xfrm>
-            <a:off x="722313" y="3305176"/>
-            <a:ext cx="7772400" cy="1021556"/>
-          </a:xfrm>
-        </p:spPr>
+        <p:spPr/>
         <p:txBody>
           <a:bodyPr/>
           <a:lstStyle/>
@@ -4173,61 +4183,14 @@
             </a:pPr>
             <a:r>
               <a:rPr/>
-              <a:t>Australia Simulation</a:t>
-            </a:r>
-          </a:p>
-        </p:txBody>
-      </p:sp>
-    </p:spTree>
-  </p:cSld>
-</p:sld>
-</file>
-
-<file path=ppt/slides/slide21.xml><?xml version="1.0" encoding="utf-8"?>
-<p:sld xmlns:a="http://schemas.openxmlformats.org/drawingml/2006/main" xmlns:r="http://schemas.openxmlformats.org/officeDocument/2006/relationships" xmlns:p="http://schemas.openxmlformats.org/presentationml/2006/main">
-  <p:cSld>
-    <p:spTree>
-      <p:nvGrpSpPr>
-        <p:cNvPr id="1" name=""/>
-        <p:cNvGrpSpPr/>
-        <p:nvPr/>
-      </p:nvGrpSpPr>
-      <p:grpSpPr>
-        <a:xfrm>
-          <a:off x="0" y="0"/>
-          <a:ext cx="0" cy="0"/>
-          <a:chOff x="0" y="0"/>
-          <a:chExt cx="0" cy="0"/>
-        </a:xfrm>
-      </p:grpSpPr>
-      <p:sp>
-        <p:nvSpPr>
-          <p:cNvPr id="2" name="Title 1"/>
-          <p:cNvSpPr>
-            <a:spLocks noGrp="1"/>
-          </p:cNvSpPr>
-          <p:nvPr>
-            <p:ph type="title"/>
-          </p:nvPr>
-        </p:nvSpPr>
-        <p:spPr/>
-        <p:txBody>
-          <a:bodyPr/>
-          <a:lstStyle/>
-          <a:p>
-            <a:pPr lvl="0" indent="0" marL="0">
-              <a:buNone/>
-            </a:pPr>
-            <a:r>
-              <a:rPr/>
-              <a:t>Initial Data for Australia (Cases)</a:t>
+              <a:t>Applying the day of flex indicator to the plot (Fatalities)</a:t>
             </a:r>
           </a:p>
         </p:txBody>
       </p:sp>
       <p:pic>
         <p:nvPicPr>
-          <p:cNvPr descr="powerpoint_files/figure-pptx/unnamed-chunk-21-1.png" id="0" name="Picture 1"/>
+          <p:cNvPr descr="powerpoint_files/figure-pptx/unnamed-chunk-20-1.png" id="0" name="Picture 1"/>
           <p:cNvPicPr>
             <a:picLocks noGrp="1" noChangeAspect="1"/>
           </p:cNvPicPr>
@@ -4260,6 +4223,58 @@
 </p:sld>
 </file>
 
+<file path=ppt/slides/slide21.xml><?xml version="1.0" encoding="utf-8"?>
+<p:sld xmlns:a="http://schemas.openxmlformats.org/drawingml/2006/main" xmlns:r="http://schemas.openxmlformats.org/officeDocument/2006/relationships" xmlns:p="http://schemas.openxmlformats.org/presentationml/2006/main">
+  <p:cSld>
+    <p:spTree>
+      <p:nvGrpSpPr>
+        <p:cNvPr id="1" name=""/>
+        <p:cNvGrpSpPr/>
+        <p:nvPr/>
+      </p:nvGrpSpPr>
+      <p:grpSpPr>
+        <a:xfrm>
+          <a:off x="0" y="0"/>
+          <a:ext cx="0" cy="0"/>
+          <a:chOff x="0" y="0"/>
+          <a:chExt cx="0" cy="0"/>
+        </a:xfrm>
+      </p:grpSpPr>
+      <p:sp>
+        <p:nvSpPr>
+          <p:cNvPr id="2" name="Title 1"/>
+          <p:cNvSpPr>
+            <a:spLocks noGrp="1"/>
+          </p:cNvSpPr>
+          <p:nvPr>
+            <p:ph type="title"/>
+          </p:nvPr>
+        </p:nvSpPr>
+        <p:spPr>
+          <a:xfrm>
+            <a:off x="722313" y="3305176"/>
+            <a:ext cx="7772400" cy="1021556"/>
+          </a:xfrm>
+        </p:spPr>
+        <p:txBody>
+          <a:bodyPr/>
+          <a:lstStyle/>
+          <a:p>
+            <a:pPr lvl="0" indent="0" marL="0">
+              <a:buNone/>
+            </a:pPr>
+            <a:r>
+              <a:rPr/>
+              <a:t>Australia Simulation</a:t>
+            </a:r>
+          </a:p>
+        </p:txBody>
+      </p:sp>
+    </p:spTree>
+  </p:cSld>
+</p:sld>
+</file>
+
 <file path=ppt/slides/slide22.xml><?xml version="1.0" encoding="utf-8"?>
 <p:sld xmlns:a="http://schemas.openxmlformats.org/drawingml/2006/main" xmlns:r="http://schemas.openxmlformats.org/officeDocument/2006/relationships" xmlns:p="http://schemas.openxmlformats.org/presentationml/2006/main">
   <p:cSld>
@@ -4297,7 +4312,7 @@
             </a:pPr>
             <a:r>
               <a:rPr/>
-              <a:t>Initial Data for Australia (Fatalities)</a:t>
+              <a:t>Initial Data for Australia (Cases)</a:t>
             </a:r>
           </a:p>
         </p:txBody>
@@ -4374,14 +4389,14 @@
             </a:pPr>
             <a:r>
               <a:rPr/>
-              <a:t>Fitting a Gauss Error Function to Australia Data (Cases)</a:t>
+              <a:t>Initial Data for Australia (Fatalities)</a:t>
             </a:r>
           </a:p>
         </p:txBody>
       </p:sp>
       <p:pic>
         <p:nvPicPr>
-          <p:cNvPr descr="powerpoint_files/figure-pptx/unnamed-chunk-24-1.png" id="0" name="Picture 1"/>
+          <p:cNvPr descr="powerpoint_files/figure-pptx/unnamed-chunk-23-1.png" id="0" name="Picture 1"/>
           <p:cNvPicPr>
             <a:picLocks noGrp="1" noChangeAspect="1"/>
           </p:cNvPicPr>
@@ -4451,7 +4466,7 @@
             </a:pPr>
             <a:r>
               <a:rPr/>
-              <a:t>Fitting a Gauss Error Function to Australia Data (Fatalities)</a:t>
+              <a:t>Fitting a Gauss Error Function to Australia Data (Cases)</a:t>
             </a:r>
           </a:p>
         </p:txBody>
@@ -4528,14 +4543,14 @@
             </a:pPr>
             <a:r>
               <a:rPr/>
-              <a:t>Applying the function to the future dataset (Cases)</a:t>
+              <a:t>Fitting a Gauss Error Function to Australia Data (Fatalities)</a:t>
             </a:r>
           </a:p>
         </p:txBody>
       </p:sp>
       <p:pic>
         <p:nvPicPr>
-          <p:cNvPr descr="powerpoint_files/figure-pptx/unnamed-chunk-28-1.png" id="0" name="Picture 1"/>
+          <p:cNvPr descr="powerpoint_files/figure-pptx/unnamed-chunk-26-1.png" id="0" name="Picture 1"/>
           <p:cNvPicPr>
             <a:picLocks noGrp="1" noChangeAspect="1"/>
           </p:cNvPicPr>
@@ -4605,7 +4620,7 @@
             </a:pPr>
             <a:r>
               <a:rPr/>
-              <a:t>Applying the function to the future dataset (Fatalities)</a:t>
+              <a:t>Applying the function to the future dataset (Cases)</a:t>
             </a:r>
           </a:p>
         </p:txBody>
@@ -4672,12 +4687,7 @@
             <p:ph type="title"/>
           </p:nvPr>
         </p:nvSpPr>
-        <p:spPr>
-          <a:xfrm>
-            <a:off x="722313" y="3305176"/>
-            <a:ext cx="7772400" cy="1021556"/>
-          </a:xfrm>
-        </p:spPr>
+        <p:spPr/>
         <p:txBody>
           <a:bodyPr/>
           <a:lstStyle/>
@@ -4687,61 +4697,14 @@
             </a:pPr>
             <a:r>
               <a:rPr/>
-              <a:t>MonteCarlo Simulation for Australia’s Day of Flex</a:t>
-            </a:r>
-          </a:p>
-        </p:txBody>
-      </p:sp>
-    </p:spTree>
-  </p:cSld>
-</p:sld>
-</file>
-
-<file path=ppt/slides/slide28.xml><?xml version="1.0" encoding="utf-8"?>
-<p:sld xmlns:a="http://schemas.openxmlformats.org/drawingml/2006/main" xmlns:r="http://schemas.openxmlformats.org/officeDocument/2006/relationships" xmlns:p="http://schemas.openxmlformats.org/presentationml/2006/main">
-  <p:cSld>
-    <p:spTree>
-      <p:nvGrpSpPr>
-        <p:cNvPr id="1" name=""/>
-        <p:cNvGrpSpPr/>
-        <p:nvPr/>
-      </p:nvGrpSpPr>
-      <p:grpSpPr>
-        <a:xfrm>
-          <a:off x="0" y="0"/>
-          <a:ext cx="0" cy="0"/>
-          <a:chOff x="0" y="0"/>
-          <a:chExt cx="0" cy="0"/>
-        </a:xfrm>
-      </p:grpSpPr>
-      <p:sp>
-        <p:nvSpPr>
-          <p:cNvPr id="2" name="Title 1"/>
-          <p:cNvSpPr>
-            <a:spLocks noGrp="1"/>
-          </p:cNvSpPr>
-          <p:nvPr>
-            <p:ph type="title"/>
-          </p:nvPr>
-        </p:nvSpPr>
-        <p:spPr/>
-        <p:txBody>
-          <a:bodyPr/>
-          <a:lstStyle/>
-          <a:p>
-            <a:pPr lvl="0" indent="0" marL="0">
-              <a:buNone/>
-            </a:pPr>
-            <a:r>
-              <a:rPr/>
-              <a:t>MonteCarlo Simulation Data (Cases) (150 trials)</a:t>
+              <a:t>Applying the function to the future dataset (Fatalities)</a:t>
             </a:r>
           </a:p>
         </p:txBody>
       </p:sp>
       <p:pic>
         <p:nvPicPr>
-          <p:cNvPr descr="powerpoint_files/figure-pptx/unnamed-chunk-33-1.png" id="0" name="Picture 1"/>
+          <p:cNvPr descr="powerpoint_files/figure-pptx/unnamed-chunk-30-1.png" id="0" name="Picture 1"/>
           <p:cNvPicPr>
             <a:picLocks noGrp="1" noChangeAspect="1"/>
           </p:cNvPicPr>
@@ -4774,6 +4737,58 @@
 </p:sld>
 </file>
 
+<file path=ppt/slides/slide28.xml><?xml version="1.0" encoding="utf-8"?>
+<p:sld xmlns:a="http://schemas.openxmlformats.org/drawingml/2006/main" xmlns:r="http://schemas.openxmlformats.org/officeDocument/2006/relationships" xmlns:p="http://schemas.openxmlformats.org/presentationml/2006/main">
+  <p:cSld>
+    <p:spTree>
+      <p:nvGrpSpPr>
+        <p:cNvPr id="1" name=""/>
+        <p:cNvGrpSpPr/>
+        <p:nvPr/>
+      </p:nvGrpSpPr>
+      <p:grpSpPr>
+        <a:xfrm>
+          <a:off x="0" y="0"/>
+          <a:ext cx="0" cy="0"/>
+          <a:chOff x="0" y="0"/>
+          <a:chExt cx="0" cy="0"/>
+        </a:xfrm>
+      </p:grpSpPr>
+      <p:sp>
+        <p:nvSpPr>
+          <p:cNvPr id="2" name="Title 1"/>
+          <p:cNvSpPr>
+            <a:spLocks noGrp="1"/>
+          </p:cNvSpPr>
+          <p:nvPr>
+            <p:ph type="title"/>
+          </p:nvPr>
+        </p:nvSpPr>
+        <p:spPr>
+          <a:xfrm>
+            <a:off x="722313" y="3305176"/>
+            <a:ext cx="7772400" cy="1021556"/>
+          </a:xfrm>
+        </p:spPr>
+        <p:txBody>
+          <a:bodyPr/>
+          <a:lstStyle/>
+          <a:p>
+            <a:pPr lvl="0" indent="0" marL="0">
+              <a:buNone/>
+            </a:pPr>
+            <a:r>
+              <a:rPr/>
+              <a:t>MonteCarlo Simulation for Australia’s Day of Flex</a:t>
+            </a:r>
+          </a:p>
+        </p:txBody>
+      </p:sp>
+    </p:spTree>
+  </p:cSld>
+</p:sld>
+</file>
+
 <file path=ppt/slides/slide29.xml><?xml version="1.0" encoding="utf-8"?>
 <p:sld xmlns:a="http://schemas.openxmlformats.org/drawingml/2006/main" xmlns:r="http://schemas.openxmlformats.org/officeDocument/2006/relationships" xmlns:p="http://schemas.openxmlformats.org/presentationml/2006/main">
   <p:cSld>
@@ -4811,7 +4826,7 @@
             </a:pPr>
             <a:r>
               <a:rPr/>
-              <a:t>MonteCarlo Simulation Data (Fatalities) (150 trials)</a:t>
+              <a:t>MonteCarlo Simulation Data (Cases) (150 trials)</a:t>
             </a:r>
           </a:p>
         </p:txBody>
@@ -5042,91 +5057,14 @@
             </a:pPr>
             <a:r>
               <a:rPr/>
-              <a:t>Using MonteCarlo Simulation to Predict the Day of Flex</a:t>
-            </a:r>
-          </a:p>
-        </p:txBody>
-      </p:sp>
-      <p:sp>
-        <p:nvSpPr>
-          <p:cNvPr id="3" name="Content Placeholder 2"/>
-          <p:cNvSpPr>
-            <a:spLocks noGrp="1"/>
-          </p:cNvSpPr>
-          <p:nvPr>
-            <p:ph idx="1"/>
-          </p:nvPr>
-        </p:nvSpPr>
-        <p:spPr/>
-        <p:txBody>
-          <a:bodyPr/>
-          <a:lstStyle/>
-          <a:p>
-            <a:pPr lvl="0"/>
-            <a:r>
-              <a:rPr/>
-              <a:t>The mean of the day of flex for cases is 60.22 days and the standard deviation is 0.77 days.</a:t>
-            </a:r>
-          </a:p>
-          <a:p>
-            <a:pPr lvl="0"/>
-            <a:r>
-              <a:rPr/>
-              <a:t>The mean of the day of flex for fatalities is 81.4 days and the standard deviation is 0.69 days.</a:t>
-            </a:r>
-          </a:p>
-        </p:txBody>
-      </p:sp>
-    </p:spTree>
-  </p:cSld>
-</p:sld>
-</file>
-
-<file path=ppt/slides/slide31.xml><?xml version="1.0" encoding="utf-8"?>
-<p:sld xmlns:a="http://schemas.openxmlformats.org/drawingml/2006/main" xmlns:r="http://schemas.openxmlformats.org/officeDocument/2006/relationships" xmlns:p="http://schemas.openxmlformats.org/presentationml/2006/main">
-  <p:cSld>
-    <p:spTree>
-      <p:nvGrpSpPr>
-        <p:cNvPr id="1" name=""/>
-        <p:cNvGrpSpPr/>
-        <p:nvPr/>
-      </p:nvGrpSpPr>
-      <p:grpSpPr>
-        <a:xfrm>
-          <a:off x="0" y="0"/>
-          <a:ext cx="0" cy="0"/>
-          <a:chOff x="0" y="0"/>
-          <a:chExt cx="0" cy="0"/>
-        </a:xfrm>
-      </p:grpSpPr>
-      <p:sp>
-        <p:nvSpPr>
-          <p:cNvPr id="2" name="Title 1"/>
-          <p:cNvSpPr>
-            <a:spLocks noGrp="1"/>
-          </p:cNvSpPr>
-          <p:nvPr>
-            <p:ph type="title"/>
-          </p:nvPr>
-        </p:nvSpPr>
-        <p:spPr/>
-        <p:txBody>
-          <a:bodyPr/>
-          <a:lstStyle/>
-          <a:p>
-            <a:pPr lvl="0" indent="0" marL="0">
-              <a:buNone/>
-            </a:pPr>
-            <a:r>
-              <a:rPr/>
-              <a:t>Applying the day of flex indicator to the data (Cases)</a:t>
+              <a:t>MonteCarlo Simulation Data (Fatalities) (150 trials)</a:t>
             </a:r>
           </a:p>
         </p:txBody>
       </p:sp>
       <p:pic>
         <p:nvPicPr>
-          <p:cNvPr descr="powerpoint_files/figure-pptx/unnamed-chunk-36-1.png" id="0" name="Picture 1"/>
+          <p:cNvPr descr="powerpoint_files/figure-pptx/unnamed-chunk-35-1.png" id="0" name="Picture 1"/>
           <p:cNvPicPr>
             <a:picLocks noGrp="1" noChangeAspect="1"/>
           </p:cNvPicPr>
@@ -5159,6 +5097,83 @@
 </p:sld>
 </file>
 
+<file path=ppt/slides/slide31.xml><?xml version="1.0" encoding="utf-8"?>
+<p:sld xmlns:a="http://schemas.openxmlformats.org/drawingml/2006/main" xmlns:r="http://schemas.openxmlformats.org/officeDocument/2006/relationships" xmlns:p="http://schemas.openxmlformats.org/presentationml/2006/main">
+  <p:cSld>
+    <p:spTree>
+      <p:nvGrpSpPr>
+        <p:cNvPr id="1" name=""/>
+        <p:cNvGrpSpPr/>
+        <p:nvPr/>
+      </p:nvGrpSpPr>
+      <p:grpSpPr>
+        <a:xfrm>
+          <a:off x="0" y="0"/>
+          <a:ext cx="0" cy="0"/>
+          <a:chOff x="0" y="0"/>
+          <a:chExt cx="0" cy="0"/>
+        </a:xfrm>
+      </p:grpSpPr>
+      <p:sp>
+        <p:nvSpPr>
+          <p:cNvPr id="2" name="Title 1"/>
+          <p:cNvSpPr>
+            <a:spLocks noGrp="1"/>
+          </p:cNvSpPr>
+          <p:nvPr>
+            <p:ph type="title"/>
+          </p:nvPr>
+        </p:nvSpPr>
+        <p:spPr/>
+        <p:txBody>
+          <a:bodyPr/>
+          <a:lstStyle/>
+          <a:p>
+            <a:pPr lvl="0" indent="0" marL="0">
+              <a:buNone/>
+            </a:pPr>
+            <a:r>
+              <a:rPr/>
+              <a:t>Using MonteCarlo Simulation to Predict the Day of Flex</a:t>
+            </a:r>
+          </a:p>
+        </p:txBody>
+      </p:sp>
+      <p:sp>
+        <p:nvSpPr>
+          <p:cNvPr id="3" name="Content Placeholder 2"/>
+          <p:cNvSpPr>
+            <a:spLocks noGrp="1"/>
+          </p:cNvSpPr>
+          <p:nvPr>
+            <p:ph idx="1"/>
+          </p:nvPr>
+        </p:nvSpPr>
+        <p:spPr/>
+        <p:txBody>
+          <a:bodyPr/>
+          <a:lstStyle/>
+          <a:p>
+            <a:pPr lvl="0"/>
+            <a:r>
+              <a:rPr/>
+              <a:t>The mean of the day of flex for cases is 60.22 days and the standard deviation is 0.77 days.</a:t>
+            </a:r>
+          </a:p>
+          <a:p>
+            <a:pPr lvl="0"/>
+            <a:r>
+              <a:rPr/>
+              <a:t>The mean of the day of flex for fatalities is 81.4 days and the standard deviation is 0.69 days.</a:t>
+            </a:r>
+          </a:p>
+        </p:txBody>
+      </p:sp>
+    </p:spTree>
+  </p:cSld>
+</p:sld>
+</file>
+
 <file path=ppt/slides/slide32.xml><?xml version="1.0" encoding="utf-8"?>
 <p:sld xmlns:a="http://schemas.openxmlformats.org/drawingml/2006/main" xmlns:r="http://schemas.openxmlformats.org/officeDocument/2006/relationships" xmlns:p="http://schemas.openxmlformats.org/presentationml/2006/main">
   <p:cSld>
@@ -5196,7 +5211,7 @@
             </a:pPr>
             <a:r>
               <a:rPr/>
-              <a:t>Applying the day of flex indicator to the data (Fatalities)</a:t>
+              <a:t>Applying the day of flex indicator to the data (Cases)</a:t>
             </a:r>
           </a:p>
         </p:txBody>
@@ -5263,12 +5278,7 @@
             <p:ph type="title"/>
           </p:nvPr>
         </p:nvSpPr>
-        <p:spPr>
-          <a:xfrm>
-            <a:off x="722313" y="3305176"/>
-            <a:ext cx="7772400" cy="1021556"/>
-          </a:xfrm>
-        </p:spPr>
+        <p:spPr/>
         <p:txBody>
           <a:bodyPr/>
           <a:lstStyle/>
@@ -5278,61 +5288,14 @@
             </a:pPr>
             <a:r>
               <a:rPr/>
-              <a:t>Confirming Results with entire dataset</a:t>
-            </a:r>
-          </a:p>
-        </p:txBody>
-      </p:sp>
-    </p:spTree>
-  </p:cSld>
-</p:sld>
-</file>
-
-<file path=ppt/slides/slide34.xml><?xml version="1.0" encoding="utf-8"?>
-<p:sld xmlns:a="http://schemas.openxmlformats.org/drawingml/2006/main" xmlns:r="http://schemas.openxmlformats.org/officeDocument/2006/relationships" xmlns:p="http://schemas.openxmlformats.org/presentationml/2006/main">
-  <p:cSld>
-    <p:spTree>
-      <p:nvGrpSpPr>
-        <p:cNvPr id="1" name=""/>
-        <p:cNvGrpSpPr/>
-        <p:nvPr/>
-      </p:nvGrpSpPr>
-      <p:grpSpPr>
-        <a:xfrm>
-          <a:off x="0" y="0"/>
-          <a:ext cx="0" cy="0"/>
-          <a:chOff x="0" y="0"/>
-          <a:chExt cx="0" cy="0"/>
-        </a:xfrm>
-      </p:grpSpPr>
-      <p:sp>
-        <p:nvSpPr>
-          <p:cNvPr id="2" name="Title 1"/>
-          <p:cNvSpPr>
-            <a:spLocks noGrp="1"/>
-          </p:cNvSpPr>
-          <p:nvPr>
-            <p:ph type="title"/>
-          </p:nvPr>
-        </p:nvSpPr>
-        <p:spPr/>
-        <p:txBody>
-          <a:bodyPr/>
-          <a:lstStyle/>
-          <a:p>
-            <a:pPr lvl="0" indent="0" marL="0">
-              <a:buNone/>
-            </a:pPr>
-            <a:r>
-              <a:rPr/>
-              <a:t>Entire data (Cases)</a:t>
+              <a:t>Applying the day of flex indicator to the data (Fatalities)</a:t>
             </a:r>
           </a:p>
         </p:txBody>
       </p:sp>
       <p:pic>
         <p:nvPicPr>
-          <p:cNvPr descr="powerpoint_files/figure-pptx/unnamed-chunk-39-1.png" id="0" name="Picture 1"/>
+          <p:cNvPr descr="powerpoint_files/figure-pptx/unnamed-chunk-38-1.png" id="0" name="Picture 1"/>
           <p:cNvPicPr>
             <a:picLocks noGrp="1" noChangeAspect="1"/>
           </p:cNvPicPr>
@@ -5365,6 +5328,58 @@
 </p:sld>
 </file>
 
+<file path=ppt/slides/slide34.xml><?xml version="1.0" encoding="utf-8"?>
+<p:sld xmlns:a="http://schemas.openxmlformats.org/drawingml/2006/main" xmlns:r="http://schemas.openxmlformats.org/officeDocument/2006/relationships" xmlns:p="http://schemas.openxmlformats.org/presentationml/2006/main">
+  <p:cSld>
+    <p:spTree>
+      <p:nvGrpSpPr>
+        <p:cNvPr id="1" name=""/>
+        <p:cNvGrpSpPr/>
+        <p:nvPr/>
+      </p:nvGrpSpPr>
+      <p:grpSpPr>
+        <a:xfrm>
+          <a:off x="0" y="0"/>
+          <a:ext cx="0" cy="0"/>
+          <a:chOff x="0" y="0"/>
+          <a:chExt cx="0" cy="0"/>
+        </a:xfrm>
+      </p:grpSpPr>
+      <p:sp>
+        <p:nvSpPr>
+          <p:cNvPr id="2" name="Title 1"/>
+          <p:cNvSpPr>
+            <a:spLocks noGrp="1"/>
+          </p:cNvSpPr>
+          <p:nvPr>
+            <p:ph type="title"/>
+          </p:nvPr>
+        </p:nvSpPr>
+        <p:spPr>
+          <a:xfrm>
+            <a:off x="722313" y="3305176"/>
+            <a:ext cx="7772400" cy="1021556"/>
+          </a:xfrm>
+        </p:spPr>
+        <p:txBody>
+          <a:bodyPr/>
+          <a:lstStyle/>
+          <a:p>
+            <a:pPr lvl="0" indent="0" marL="0">
+              <a:buNone/>
+            </a:pPr>
+            <a:r>
+              <a:rPr/>
+              <a:t>Confirming Results with entire dataset</a:t>
+            </a:r>
+          </a:p>
+        </p:txBody>
+      </p:sp>
+    </p:spTree>
+  </p:cSld>
+</p:sld>
+</file>
+
 <file path=ppt/slides/slide35.xml><?xml version="1.0" encoding="utf-8"?>
 <p:sld xmlns:a="http://schemas.openxmlformats.org/drawingml/2006/main" xmlns:r="http://schemas.openxmlformats.org/officeDocument/2006/relationships" xmlns:p="http://schemas.openxmlformats.org/presentationml/2006/main">
   <p:cSld>
@@ -5402,7 +5417,7 @@
             </a:pPr>
             <a:r>
               <a:rPr/>
-              <a:t>Entire data (Fatalities)</a:t>
+              <a:t>Entire data (Cases)</a:t>
             </a:r>
           </a:p>
         </p:txBody>
@@ -5469,12 +5484,7 @@
             <p:ph type="title"/>
           </p:nvPr>
         </p:nvSpPr>
-        <p:spPr>
-          <a:xfrm>
-            <a:off x="722313" y="3305176"/>
-            <a:ext cx="7772400" cy="1021556"/>
-          </a:xfrm>
-        </p:spPr>
+        <p:spPr/>
         <p:txBody>
           <a:bodyPr/>
           <a:lstStyle/>
@@ -5484,61 +5494,14 @@
             </a:pPr>
             <a:r>
               <a:rPr/>
-              <a:t>Interesting Anomaly with United States Data</a:t>
-            </a:r>
-          </a:p>
-        </p:txBody>
-      </p:sp>
-    </p:spTree>
-  </p:cSld>
-</p:sld>
-</file>
-
-<file path=ppt/slides/slide37.xml><?xml version="1.0" encoding="utf-8"?>
-<p:sld xmlns:a="http://schemas.openxmlformats.org/drawingml/2006/main" xmlns:r="http://schemas.openxmlformats.org/officeDocument/2006/relationships" xmlns:p="http://schemas.openxmlformats.org/presentationml/2006/main">
-  <p:cSld>
-    <p:spTree>
-      <p:nvGrpSpPr>
-        <p:cNvPr id="1" name=""/>
-        <p:cNvGrpSpPr/>
-        <p:nvPr/>
-      </p:nvGrpSpPr>
-      <p:grpSpPr>
-        <a:xfrm>
-          <a:off x="0" y="0"/>
-          <a:ext cx="0" cy="0"/>
-          <a:chOff x="0" y="0"/>
-          <a:chExt cx="0" cy="0"/>
-        </a:xfrm>
-      </p:grpSpPr>
-      <p:sp>
-        <p:nvSpPr>
-          <p:cNvPr id="2" name="Title 1"/>
-          <p:cNvSpPr>
-            <a:spLocks noGrp="1"/>
-          </p:cNvSpPr>
-          <p:nvPr>
-            <p:ph type="title"/>
-          </p:nvPr>
-        </p:nvSpPr>
-        <p:spPr/>
-        <p:txBody>
-          <a:bodyPr/>
-          <a:lstStyle/>
-          <a:p>
-            <a:pPr lvl="0" indent="0" marL="0">
-              <a:buNone/>
-            </a:pPr>
-            <a:r>
-              <a:rPr/>
-              <a:t>All United States Data (Cases)</a:t>
+              <a:t>Entire data (Fatalities)</a:t>
             </a:r>
           </a:p>
         </p:txBody>
       </p:sp>
       <p:pic>
         <p:nvPicPr>
-          <p:cNvPr descr="powerpoint_files/figure-pptx/unnamed-chunk-42-1.png" id="0" name="Picture 1"/>
+          <p:cNvPr descr="powerpoint_files/figure-pptx/unnamed-chunk-41-1.png" id="0" name="Picture 1"/>
           <p:cNvPicPr>
             <a:picLocks noGrp="1" noChangeAspect="1"/>
           </p:cNvPicPr>
@@ -5571,6 +5534,58 @@
 </p:sld>
 </file>
 
+<file path=ppt/slides/slide37.xml><?xml version="1.0" encoding="utf-8"?>
+<p:sld xmlns:a="http://schemas.openxmlformats.org/drawingml/2006/main" xmlns:r="http://schemas.openxmlformats.org/officeDocument/2006/relationships" xmlns:p="http://schemas.openxmlformats.org/presentationml/2006/main">
+  <p:cSld>
+    <p:spTree>
+      <p:nvGrpSpPr>
+        <p:cNvPr id="1" name=""/>
+        <p:cNvGrpSpPr/>
+        <p:nvPr/>
+      </p:nvGrpSpPr>
+      <p:grpSpPr>
+        <a:xfrm>
+          <a:off x="0" y="0"/>
+          <a:ext cx="0" cy="0"/>
+          <a:chOff x="0" y="0"/>
+          <a:chExt cx="0" cy="0"/>
+        </a:xfrm>
+      </p:grpSpPr>
+      <p:sp>
+        <p:nvSpPr>
+          <p:cNvPr id="2" name="Title 1"/>
+          <p:cNvSpPr>
+            <a:spLocks noGrp="1"/>
+          </p:cNvSpPr>
+          <p:nvPr>
+            <p:ph type="title"/>
+          </p:nvPr>
+        </p:nvSpPr>
+        <p:spPr>
+          <a:xfrm>
+            <a:off x="722313" y="3305176"/>
+            <a:ext cx="7772400" cy="1021556"/>
+          </a:xfrm>
+        </p:spPr>
+        <p:txBody>
+          <a:bodyPr/>
+          <a:lstStyle/>
+          <a:p>
+            <a:pPr lvl="0" indent="0" marL="0">
+              <a:buNone/>
+            </a:pPr>
+            <a:r>
+              <a:rPr/>
+              <a:t>Interesting Anomaly with United States Data</a:t>
+            </a:r>
+          </a:p>
+        </p:txBody>
+      </p:sp>
+    </p:spTree>
+  </p:cSld>
+</p:sld>
+</file>
+
 <file path=ppt/slides/slide38.xml><?xml version="1.0" encoding="utf-8"?>
 <p:sld xmlns:a="http://schemas.openxmlformats.org/drawingml/2006/main" xmlns:r="http://schemas.openxmlformats.org/officeDocument/2006/relationships" xmlns:p="http://schemas.openxmlformats.org/presentationml/2006/main">
   <p:cSld>
@@ -5608,7 +5623,7 @@
             </a:pPr>
             <a:r>
               <a:rPr/>
-              <a:t>All United States Data (Fatalities)</a:t>
+              <a:t>All United States Data (Cases)</a:t>
             </a:r>
           </a:p>
         </p:txBody>
@@ -5685,76 +5700,41 @@
             </a:pPr>
             <a:r>
               <a:rPr/>
-              <a:t>Conclusion</a:t>
-            </a:r>
-          </a:p>
-        </p:txBody>
-      </p:sp>
-      <p:sp>
-        <p:nvSpPr>
-          <p:cNvPr id="3" name="Content Placeholder 2"/>
-          <p:cNvSpPr>
-            <a:spLocks noGrp="1"/>
-          </p:cNvSpPr>
-          <p:nvPr>
-            <p:ph idx="1"/>
-          </p:nvPr>
-        </p:nvSpPr>
-        <p:spPr/>
-        <p:txBody>
-          <a:bodyPr/>
-          <a:lstStyle/>
-          <a:p>
-            <a:pPr lvl="0"/>
-            <a:r>
-              <a:rPr/>
-              <a:t>The day of flex indicator is a good indicator to predict the time of the peak of the pandemic (for most countries).</a:t>
-            </a:r>
-          </a:p>
-          <a:p>
-            <a:pPr lvl="0"/>
-            <a:r>
-              <a:rPr/>
-              <a:t>The gauss error function is a good for countries like…</a:t>
-            </a:r>
-          </a:p>
-          <a:p>
-            <a:pPr lvl="1"/>
-            <a:r>
-              <a:rPr/>
-              <a:t>China, Italy and Australia</a:t>
-            </a:r>
-          </a:p>
-          <a:p>
-            <a:pPr lvl="0"/>
-            <a:r>
-              <a:rPr/>
-              <a:t>The gauss error function is not a good fit for countries like…</a:t>
-            </a:r>
-          </a:p>
-          <a:p>
-            <a:pPr lvl="1"/>
-            <a:r>
-              <a:rPr/>
-              <a:t>United States</a:t>
-            </a:r>
-          </a:p>
-          <a:p>
-            <a:pPr lvl="1"/>
-            <a:r>
-              <a:rPr/>
-              <a:t>Any other countries who may have different covid restrictions</a:t>
-            </a:r>
-          </a:p>
-          <a:p>
-            <a:pPr lvl="0"/>
-            <a:r>
-              <a:rPr/>
-              <a:t>MonteCarlo simulations are neccesary due to the uncertainty of the data.</a:t>
-            </a:r>
-          </a:p>
-        </p:txBody>
-      </p:sp>
+              <a:t>All United States Data (Fatalities)</a:t>
+            </a:r>
+          </a:p>
+        </p:txBody>
+      </p:sp>
+      <p:pic>
+        <p:nvPicPr>
+          <p:cNvPr descr="powerpoint_files/figure-pptx/unnamed-chunk-44-1.png" id="0" name="Picture 1"/>
+          <p:cNvPicPr>
+            <a:picLocks noGrp="1" noChangeAspect="1"/>
+          </p:cNvPicPr>
+          <p:nvPr/>
+        </p:nvPicPr>
+        <p:blipFill>
+          <a:blip r:embed="rId2"/>
+          <a:stretch>
+            <a:fillRect/>
+          </a:stretch>
+        </p:blipFill>
+        <p:spPr bwMode="auto">
+          <a:xfrm>
+            <a:off x="2032000" y="1193800"/>
+            <a:ext cx="5080000" cy="3390900"/>
+          </a:xfrm>
+          <a:prstGeom prst="rect">
+            <a:avLst/>
+          </a:prstGeom>
+          <a:noFill/>
+          <a:ln w="9525">
+            <a:noFill/>
+            <a:headEnd/>
+            <a:tailEnd/>
+          </a:ln>
+        </p:spPr>
+      </p:pic>
     </p:spTree>
   </p:cSld>
 </p:sld>
@@ -5813,6 +5793,118 @@
 </file>
 
 <file path=ppt/slides/slide40.xml><?xml version="1.0" encoding="utf-8"?>
+<p:sld xmlns:a="http://schemas.openxmlformats.org/drawingml/2006/main" xmlns:r="http://schemas.openxmlformats.org/officeDocument/2006/relationships" xmlns:p="http://schemas.openxmlformats.org/presentationml/2006/main">
+  <p:cSld>
+    <p:spTree>
+      <p:nvGrpSpPr>
+        <p:cNvPr id="1" name=""/>
+        <p:cNvGrpSpPr/>
+        <p:nvPr/>
+      </p:nvGrpSpPr>
+      <p:grpSpPr>
+        <a:xfrm>
+          <a:off x="0" y="0"/>
+          <a:ext cx="0" cy="0"/>
+          <a:chOff x="0" y="0"/>
+          <a:chExt cx="0" cy="0"/>
+        </a:xfrm>
+      </p:grpSpPr>
+      <p:sp>
+        <p:nvSpPr>
+          <p:cNvPr id="2" name="Title 1"/>
+          <p:cNvSpPr>
+            <a:spLocks noGrp="1"/>
+          </p:cNvSpPr>
+          <p:nvPr>
+            <p:ph type="title"/>
+          </p:nvPr>
+        </p:nvSpPr>
+        <p:spPr/>
+        <p:txBody>
+          <a:bodyPr/>
+          <a:lstStyle/>
+          <a:p>
+            <a:pPr lvl="0" indent="0" marL="0">
+              <a:buNone/>
+            </a:pPr>
+            <a:r>
+              <a:rPr/>
+              <a:t>Conclusion</a:t>
+            </a:r>
+          </a:p>
+        </p:txBody>
+      </p:sp>
+      <p:sp>
+        <p:nvSpPr>
+          <p:cNvPr id="3" name="Content Placeholder 2"/>
+          <p:cNvSpPr>
+            <a:spLocks noGrp="1"/>
+          </p:cNvSpPr>
+          <p:nvPr>
+            <p:ph idx="1"/>
+          </p:nvPr>
+        </p:nvSpPr>
+        <p:spPr/>
+        <p:txBody>
+          <a:bodyPr/>
+          <a:lstStyle/>
+          <a:p>
+            <a:pPr lvl="0"/>
+            <a:r>
+              <a:rPr/>
+              <a:t>The day of flex indicator is a good indicator to predict the time of the peak of the pandemic (for most countries).</a:t>
+            </a:r>
+          </a:p>
+          <a:p>
+            <a:pPr lvl="0"/>
+            <a:r>
+              <a:rPr/>
+              <a:t>The gauss error function is a good for countries like…</a:t>
+            </a:r>
+          </a:p>
+          <a:p>
+            <a:pPr lvl="1"/>
+            <a:r>
+              <a:rPr/>
+              <a:t>China, Italy and Australia</a:t>
+            </a:r>
+          </a:p>
+          <a:p>
+            <a:pPr lvl="0"/>
+            <a:r>
+              <a:rPr/>
+              <a:t>The gauss error function is not a good fit for countries like…</a:t>
+            </a:r>
+          </a:p>
+          <a:p>
+            <a:pPr lvl="1"/>
+            <a:r>
+              <a:rPr/>
+              <a:t>United States</a:t>
+            </a:r>
+          </a:p>
+          <a:p>
+            <a:pPr lvl="1"/>
+            <a:r>
+              <a:rPr/>
+              <a:t>Any other countries who may have different covid restrictions</a:t>
+            </a:r>
+          </a:p>
+          <a:p>
+            <a:pPr lvl="0"/>
+            <a:r>
+              <a:rPr/>
+              <a:t>MonteCarlo simulations are neccesary due to the uncertainty of the data.</a:t>
+            </a:r>
+          </a:p>
+        </p:txBody>
+      </p:sp>
+    </p:spTree>
+  </p:cSld>
+</p:sld>
+</file>
+
+<file path=ppt/slides/slide41.xml><?xml version="1.0" encoding="utf-8"?>
 <p:sld xmlns:a="http://schemas.openxmlformats.org/drawingml/2006/main" xmlns:r="http://schemas.openxmlformats.org/officeDocument/2006/relationships" xmlns:p="http://schemas.openxmlformats.org/presentationml/2006/main">
   <p:cSld>
     <p:spTree>

</xml_diff>